<commit_message>
coursework docx, pdf, pptx
</commit_message>
<xml_diff>
--- a/4 курс/Прогнозно-аналитические системы/Курсовая работа/Курсовая_работа_КимКС.pptx
+++ b/4 курс/Прогнозно-аналитические системы/Курсовая работа/Курсовая_работа_КимКС.pptx
@@ -7521,13 +7521,13 @@
         </p:nvSpPr>
         <p:spPr>
           <a:xfrm>
-            <a:off x="840102" y="1391479"/>
-            <a:ext cx="10511798" cy="5218043"/>
+            <a:off x="525476" y="1202265"/>
+            <a:ext cx="10968833" cy="5655734"/>
           </a:xfrm>
         </p:spPr>
         <p:txBody>
           <a:bodyPr>
-            <a:normAutofit fontScale="85000" lnSpcReduction="10000"/>
+            <a:noAutofit/>
           </a:bodyPr>
           <a:lstStyle/>
           <a:p>
@@ -7541,7 +7541,7 @@
               <a:buNone/>
             </a:pPr>
             <a:r>
-              <a:rPr lang="ru-RU" sz="1800" dirty="0">
+              <a:rPr lang="ru-RU" sz="1600" dirty="0">
                 <a:latin typeface="Times New Roman" panose="02020603050405020304" pitchFamily="18" charset="0"/>
                 <a:ea typeface="Times New Roman" panose="02020603050405020304" pitchFamily="18" charset="0"/>
                 <a:cs typeface="Times New Roman" panose="02020603050405020304" pitchFamily="18" charset="0"/>
@@ -7549,7 +7549,7 @@
               <a:t>Цель данной курсовой работы — </a:t>
             </a:r>
             <a:r>
-              <a:rPr lang="ru-RU" sz="1800" dirty="0">
+              <a:rPr lang="ru-RU" sz="1600" dirty="0">
                 <a:latin typeface="Times New Roman" panose="02020603050405020304" pitchFamily="18" charset="0"/>
                 <a:ea typeface="Calibri" panose="020F0502020204030204" pitchFamily="34" charset="0"/>
                 <a:cs typeface="Times New Roman" panose="02020603050405020304" pitchFamily="18" charset="0"/>
@@ -7557,7 +7557,7 @@
               <a:t>разработать и протестировать сценарий анализа и обработки данных для прогнозирования оттока клиентов банка с использованием логистической регрессии </a:t>
             </a:r>
             <a:r>
-              <a:rPr lang="ru-RU" sz="1800" dirty="0">
+              <a:rPr lang="ru-RU" sz="1600" dirty="0">
                 <a:latin typeface="Times New Roman" panose="02020603050405020304" pitchFamily="18" charset="0"/>
                 <a:ea typeface="Times New Roman" panose="02020603050405020304" pitchFamily="18" charset="0"/>
                 <a:cs typeface="Times New Roman" panose="02020603050405020304" pitchFamily="18" charset="0"/>
@@ -7576,7 +7576,7 @@
               <a:buNone/>
             </a:pPr>
             <a:r>
-              <a:rPr lang="ru-RU" sz="1800" dirty="0">
+              <a:rPr lang="ru-RU" sz="1600" dirty="0">
                 <a:latin typeface="Times New Roman" panose="02020603050405020304" pitchFamily="18" charset="0"/>
                 <a:ea typeface="Times New Roman" panose="02020603050405020304" pitchFamily="18" charset="0"/>
                 <a:cs typeface="Times New Roman" panose="02020603050405020304" pitchFamily="18" charset="0"/>
@@ -7594,7 +7594,7 @@
               </a:spcAft>
             </a:pPr>
             <a:r>
-              <a:rPr lang="ru-RU" sz="1800" dirty="0">
+              <a:rPr lang="ru-RU" sz="1600" dirty="0">
                 <a:latin typeface="Times New Roman" panose="02020603050405020304" pitchFamily="18" charset="0"/>
                 <a:ea typeface="Times New Roman" panose="02020603050405020304" pitchFamily="18" charset="0"/>
                 <a:cs typeface="Times New Roman" panose="02020603050405020304" pitchFamily="18" charset="0"/>
@@ -7612,7 +7612,7 @@
               </a:spcAft>
             </a:pPr>
             <a:r>
-              <a:rPr lang="ru-RU" sz="1800" dirty="0">
+              <a:rPr lang="ru-RU" sz="1600" dirty="0">
                 <a:latin typeface="Times New Roman" panose="02020603050405020304" pitchFamily="18" charset="0"/>
                 <a:ea typeface="Times New Roman" panose="02020603050405020304" pitchFamily="18" charset="0"/>
                 <a:cs typeface="Times New Roman" panose="02020603050405020304" pitchFamily="18" charset="0"/>
@@ -7630,7 +7630,7 @@
               </a:spcAft>
             </a:pPr>
             <a:r>
-              <a:rPr lang="ru-RU" sz="1800" dirty="0">
+              <a:rPr lang="ru-RU" sz="1600" dirty="0">
                 <a:latin typeface="Times New Roman" panose="02020603050405020304" pitchFamily="18" charset="0"/>
                 <a:ea typeface="Times New Roman" panose="02020603050405020304" pitchFamily="18" charset="0"/>
                 <a:cs typeface="Times New Roman" panose="02020603050405020304" pitchFamily="18" charset="0"/>
@@ -7648,7 +7648,7 @@
               </a:spcAft>
             </a:pPr>
             <a:r>
-              <a:rPr lang="ru-RU" sz="1800" dirty="0">
+              <a:rPr lang="ru-RU" sz="1600" dirty="0">
                 <a:latin typeface="Times New Roman" panose="02020603050405020304" pitchFamily="18" charset="0"/>
                 <a:ea typeface="Times New Roman" panose="02020603050405020304" pitchFamily="18" charset="0"/>
                 <a:cs typeface="Times New Roman" panose="02020603050405020304" pitchFamily="18" charset="0"/>
@@ -7666,7 +7666,7 @@
               </a:spcAft>
             </a:pPr>
             <a:r>
-              <a:rPr lang="ru-RU" sz="1800" dirty="0">
+              <a:rPr lang="ru-RU" sz="1600" dirty="0">
                 <a:latin typeface="Times New Roman" panose="02020603050405020304" pitchFamily="18" charset="0"/>
                 <a:ea typeface="Times New Roman" panose="02020603050405020304" pitchFamily="18" charset="0"/>
                 <a:cs typeface="Times New Roman" panose="02020603050405020304" pitchFamily="18" charset="0"/>
@@ -8038,18 +8038,20 @@
         </p:nvSpPr>
         <p:spPr/>
         <p:txBody>
-          <a:bodyPr/>
+          <a:bodyPr>
+            <a:normAutofit/>
+          </a:bodyPr>
           <a:lstStyle/>
           <a:p>
             <a:pPr algn="ctr"/>
             <a:r>
-              <a:rPr lang="ru-RU" dirty="0">
+              <a:rPr lang="ru-RU" sz="6400" dirty="0">
                 <a:latin typeface="Times New Roman" panose="02020603050405020304" pitchFamily="18" charset="0"/>
                 <a:cs typeface="Times New Roman" panose="02020603050405020304" pitchFamily="18" charset="0"/>
               </a:rPr>
               <a:t>Логистическая регрессия</a:t>
             </a:r>
-            <a:endParaRPr lang="ru-RU" dirty="0"/>
+            <a:endParaRPr lang="ru-RU" sz="6400" dirty="0"/>
           </a:p>
         </p:txBody>
       </p:sp>
@@ -8651,7 +8653,7 @@
                 <a:latin typeface="Times New Roman" panose="02020603050405020304" pitchFamily="18" charset="0"/>
                 <a:cs typeface="Times New Roman" panose="02020603050405020304" pitchFamily="18" charset="0"/>
               </a:rPr>
-              <a:t>Функция потерь(</a:t>
+              <a:t>Функция потерь (</a:t>
             </a:r>
             <a:r>
               <a:rPr lang="en-US" sz="6399" dirty="0">
@@ -10003,8 +10005,8 @@
             </p:nvSpPr>
             <p:spPr>
               <a:xfrm>
-                <a:off x="120718" y="980580"/>
-                <a:ext cx="5831298" cy="3045401"/>
+                <a:off x="936658" y="949497"/>
+                <a:ext cx="4199416" cy="3045401"/>
               </a:xfrm>
             </p:spPr>
             <p:txBody>
@@ -10493,8 +10495,8 @@
             </p:nvSpPr>
             <p:spPr>
               <a:xfrm>
-                <a:off x="120718" y="980580"/>
-                <a:ext cx="5831298" cy="3045401"/>
+                <a:off x="936658" y="949497"/>
+                <a:ext cx="4199416" cy="3045401"/>
               </a:xfrm>
               <a:blipFill>
                 <a:blip r:embed="rId4"/>
@@ -10534,8 +10536,8 @@
             </p:nvSpPr>
             <p:spPr>
               <a:xfrm>
-                <a:off x="444679" y="3850721"/>
-                <a:ext cx="5183377" cy="2355869"/>
+                <a:off x="444678" y="3677154"/>
+                <a:ext cx="5183377" cy="3056606"/>
               </a:xfrm>
               <a:prstGeom prst="rect">
                 <a:avLst/>
@@ -10554,7 +10556,7 @@
                   </a:lnSpc>
                 </a:pPr>
                 <a:r>
-                  <a:rPr lang="ru-RU" sz="1200" dirty="0">
+                  <a:rPr lang="ru-RU" sz="1400" dirty="0">
                     <a:latin typeface="Times New Roman" panose="02020603050405020304" pitchFamily="18" charset="0"/>
                     <a:ea typeface="Calibri" panose="020F0502020204030204" pitchFamily="34" charset="0"/>
                     <a:cs typeface="Times New Roman" panose="02020603050405020304" pitchFamily="18" charset="0"/>
@@ -10564,7 +10566,7 @@
                 <a14:m>
                   <m:oMath xmlns:m="http://schemas.openxmlformats.org/officeDocument/2006/math">
                     <m:r>
-                      <a:rPr lang="ru-RU" sz="1200" i="1">
+                      <a:rPr lang="ru-RU" sz="1400" i="1">
                         <a:latin typeface="Cambria Math" panose="02040503050406030204" pitchFamily="18" charset="0"/>
                         <a:ea typeface="Calibri" panose="020F0502020204030204" pitchFamily="34" charset="0"/>
                         <a:cs typeface="Times New Roman" panose="02020603050405020304" pitchFamily="18" charset="0"/>
@@ -10574,7 +10576,7 @@
                   </m:oMath>
                 </a14:m>
                 <a:r>
-                  <a:rPr lang="ru-RU" sz="1200" dirty="0">
+                  <a:rPr lang="ru-RU" sz="1400" dirty="0">
                     <a:latin typeface="Times New Roman" panose="02020603050405020304" pitchFamily="18" charset="0"/>
                     <a:ea typeface="Calibri" panose="020F0502020204030204" pitchFamily="34" charset="0"/>
                     <a:cs typeface="Times New Roman" panose="02020603050405020304" pitchFamily="18" charset="0"/>
@@ -10584,7 +10586,7 @@
                 <a14:m>
                   <m:oMath xmlns:m="http://schemas.openxmlformats.org/officeDocument/2006/math">
                     <m:r>
-                      <a:rPr lang="ru-RU" sz="1200" i="1">
+                      <a:rPr lang="ru-RU" sz="1400" i="1">
                         <a:latin typeface="Cambria Math" panose="02040503050406030204" pitchFamily="18" charset="0"/>
                         <a:ea typeface="Calibri" panose="020F0502020204030204" pitchFamily="34" charset="0"/>
                         <a:cs typeface="Times New Roman" panose="02020603050405020304" pitchFamily="18" charset="0"/>
@@ -10594,7 +10596,7 @@
                   </m:oMath>
                 </a14:m>
                 <a:r>
-                  <a:rPr lang="ru-RU" sz="1200" dirty="0">
+                  <a:rPr lang="ru-RU" sz="1400" dirty="0">
                     <a:latin typeface="Times New Roman" panose="02020603050405020304" pitchFamily="18" charset="0"/>
                     <a:ea typeface="Calibri" panose="020F0502020204030204" pitchFamily="34" charset="0"/>
                     <a:cs typeface="Times New Roman" panose="02020603050405020304" pitchFamily="18" charset="0"/>
@@ -10604,7 +10606,7 @@
                 <a14:m>
                   <m:oMath xmlns:m="http://schemas.openxmlformats.org/officeDocument/2006/math">
                     <m:r>
-                      <a:rPr lang="ru-RU" sz="1200" i="1">
+                      <a:rPr lang="ru-RU" sz="1400" i="1">
                         <a:latin typeface="Cambria Math" panose="02040503050406030204" pitchFamily="18" charset="0"/>
                         <a:ea typeface="Calibri" panose="020F0502020204030204" pitchFamily="34" charset="0"/>
                         <a:cs typeface="Times New Roman" panose="02020603050405020304" pitchFamily="18" charset="0"/>
@@ -10614,7 +10616,7 @@
                   </m:oMath>
                 </a14:m>
                 <a:r>
-                  <a:rPr lang="ru-RU" sz="1200" dirty="0">
+                  <a:rPr lang="ru-RU" sz="1400" dirty="0">
                     <a:latin typeface="Times New Roman" panose="02020603050405020304" pitchFamily="18" charset="0"/>
                     <a:ea typeface="Calibri" panose="020F0502020204030204" pitchFamily="34" charset="0"/>
                     <a:cs typeface="Times New Roman" panose="02020603050405020304" pitchFamily="18" charset="0"/>
@@ -10631,7 +10633,7 @@
                 <a14:m>
                   <m:oMath xmlns:m="http://schemas.openxmlformats.org/officeDocument/2006/math">
                     <m:r>
-                      <a:rPr lang="ru-RU" sz="1200" i="1">
+                      <a:rPr lang="ru-RU" sz="1400" i="1">
                         <a:latin typeface="Cambria Math" panose="02040503050406030204" pitchFamily="18" charset="0"/>
                         <a:ea typeface="Calibri" panose="020F0502020204030204" pitchFamily="34" charset="0"/>
                         <a:cs typeface="Times New Roman" panose="02020603050405020304" pitchFamily="18" charset="0"/>
@@ -10639,7 +10641,7 @@
                       <m:t>𝑇𝑃𝑅</m:t>
                     </m:r>
                     <m:r>
-                      <a:rPr lang="ru-RU" sz="1200" i="1">
+                      <a:rPr lang="ru-RU" sz="1400" i="1">
                         <a:latin typeface="Cambria Math" panose="02040503050406030204" pitchFamily="18" charset="0"/>
                         <a:ea typeface="Calibri" panose="020F0502020204030204" pitchFamily="34" charset="0"/>
                         <a:cs typeface="Times New Roman" panose="02020603050405020304" pitchFamily="18" charset="0"/>
@@ -10649,7 +10651,7 @@
                     <m:f>
                       <m:fPr>
                         <m:ctrlPr>
-                          <a:rPr lang="ru-RU" sz="1200" i="1">
+                          <a:rPr lang="ru-RU" sz="1400" i="1">
                             <a:latin typeface="Cambria Math" panose="02040503050406030204" pitchFamily="18" charset="0"/>
                             <a:ea typeface="Calibri" panose="020F0502020204030204" pitchFamily="34" charset="0"/>
                             <a:cs typeface="Times New Roman" panose="02020603050405020304" pitchFamily="18" charset="0"/>
@@ -10658,7 +10660,7 @@
                       </m:fPr>
                       <m:num>
                         <m:r>
-                          <a:rPr lang="ru-RU" sz="1200" i="1">
+                          <a:rPr lang="ru-RU" sz="1400" i="1">
                             <a:latin typeface="Cambria Math" panose="02040503050406030204" pitchFamily="18" charset="0"/>
                             <a:ea typeface="Calibri" panose="020F0502020204030204" pitchFamily="34" charset="0"/>
                             <a:cs typeface="Times New Roman" panose="02020603050405020304" pitchFamily="18" charset="0"/>
@@ -10668,7 +10670,7 @@
                       </m:num>
                       <m:den>
                         <m:r>
-                          <a:rPr lang="ru-RU" sz="1200" i="1">
+                          <a:rPr lang="ru-RU" sz="1400" i="1">
                             <a:latin typeface="Cambria Math" panose="02040503050406030204" pitchFamily="18" charset="0"/>
                             <a:ea typeface="Calibri" panose="020F0502020204030204" pitchFamily="34" charset="0"/>
                             <a:cs typeface="Times New Roman" panose="02020603050405020304" pitchFamily="18" charset="0"/>
@@ -10676,7 +10678,7 @@
                           <m:t>𝑇𝑃</m:t>
                         </m:r>
                         <m:r>
-                          <a:rPr lang="ru-RU" sz="1200" i="1">
+                          <a:rPr lang="ru-RU" sz="1400" i="1">
                             <a:latin typeface="Cambria Math" panose="02040503050406030204" pitchFamily="18" charset="0"/>
                             <a:ea typeface="Calibri" panose="020F0502020204030204" pitchFamily="34" charset="0"/>
                             <a:cs typeface="Times New Roman" panose="02020603050405020304" pitchFamily="18" charset="0"/>
@@ -10684,7 +10686,7 @@
                           <m:t>+</m:t>
                         </m:r>
                         <m:r>
-                          <a:rPr lang="ru-RU" sz="1200" i="1">
+                          <a:rPr lang="ru-RU" sz="1400" i="1">
                             <a:latin typeface="Cambria Math" panose="02040503050406030204" pitchFamily="18" charset="0"/>
                             <a:ea typeface="Calibri" panose="020F0502020204030204" pitchFamily="34" charset="0"/>
                             <a:cs typeface="Times New Roman" panose="02020603050405020304" pitchFamily="18" charset="0"/>
@@ -10696,14 +10698,14 @@
                   </m:oMath>
                 </a14:m>
                 <a:r>
-                  <a:rPr lang="ru-RU" sz="1200" dirty="0">
+                  <a:rPr lang="ru-RU" sz="1400" dirty="0">
                     <a:latin typeface="Times New Roman" panose="02020603050405020304" pitchFamily="18" charset="0"/>
                     <a:ea typeface="Times New Roman" panose="02020603050405020304" pitchFamily="18" charset="0"/>
                     <a:cs typeface="Times New Roman" panose="02020603050405020304" pitchFamily="18" charset="0"/>
                   </a:rPr>
                   <a:t>,</a:t>
                 </a:r>
-                <a:endParaRPr lang="ru-RU" sz="1200" dirty="0">
+                <a:endParaRPr lang="ru-RU" sz="1400" dirty="0">
                   <a:latin typeface="Times New Roman" panose="02020603050405020304" pitchFamily="18" charset="0"/>
                   <a:ea typeface="Calibri" panose="020F0502020204030204" pitchFamily="34" charset="0"/>
                   <a:cs typeface="Times New Roman" panose="02020603050405020304" pitchFamily="18" charset="0"/>
@@ -10718,7 +10720,7 @@
                 <a14:m>
                   <m:oMath xmlns:m="http://schemas.openxmlformats.org/officeDocument/2006/math">
                     <m:r>
-                      <a:rPr lang="en-US" sz="1200" i="1">
+                      <a:rPr lang="en-US" sz="1400" i="1">
                         <a:latin typeface="Cambria Math" panose="02040503050406030204" pitchFamily="18" charset="0"/>
                         <a:ea typeface="Calibri" panose="020F0502020204030204" pitchFamily="34" charset="0"/>
                         <a:cs typeface="Times New Roman" panose="02020603050405020304" pitchFamily="18" charset="0"/>
@@ -10726,7 +10728,7 @@
                       <m:t>𝐹𝑃𝑅</m:t>
                     </m:r>
                     <m:r>
-                      <a:rPr lang="ru-RU" sz="1200" i="1">
+                      <a:rPr lang="ru-RU" sz="1400" i="1">
                         <a:latin typeface="Cambria Math" panose="02040503050406030204" pitchFamily="18" charset="0"/>
                         <a:ea typeface="Calibri" panose="020F0502020204030204" pitchFamily="34" charset="0"/>
                         <a:cs typeface="Times New Roman" panose="02020603050405020304" pitchFamily="18" charset="0"/>
@@ -10736,7 +10738,7 @@
                     <m:f>
                       <m:fPr>
                         <m:ctrlPr>
-                          <a:rPr lang="ru-RU" sz="1200" i="1">
+                          <a:rPr lang="ru-RU" sz="1400" i="1">
                             <a:latin typeface="Cambria Math" panose="02040503050406030204" pitchFamily="18" charset="0"/>
                             <a:ea typeface="Calibri" panose="020F0502020204030204" pitchFamily="34" charset="0"/>
                             <a:cs typeface="Times New Roman" panose="02020603050405020304" pitchFamily="18" charset="0"/>
@@ -10745,7 +10747,7 @@
                       </m:fPr>
                       <m:num>
                         <m:r>
-                          <a:rPr lang="en-US" sz="1200" i="1">
+                          <a:rPr lang="en-US" sz="1400" i="1">
                             <a:latin typeface="Cambria Math" panose="02040503050406030204" pitchFamily="18" charset="0"/>
                             <a:ea typeface="Calibri" panose="020F0502020204030204" pitchFamily="34" charset="0"/>
                             <a:cs typeface="Times New Roman" panose="02020603050405020304" pitchFamily="18" charset="0"/>
@@ -10755,7 +10757,7 @@
                       </m:num>
                       <m:den>
                         <m:r>
-                          <a:rPr lang="en-US" sz="1200" i="1">
+                          <a:rPr lang="en-US" sz="1400" i="1">
                             <a:latin typeface="Cambria Math" panose="02040503050406030204" pitchFamily="18" charset="0"/>
                             <a:ea typeface="Calibri" panose="020F0502020204030204" pitchFamily="34" charset="0"/>
                             <a:cs typeface="Times New Roman" panose="02020603050405020304" pitchFamily="18" charset="0"/>
@@ -10763,7 +10765,7 @@
                           <m:t>𝑇𝑁</m:t>
                         </m:r>
                         <m:r>
-                          <a:rPr lang="ru-RU" sz="1200" i="1">
+                          <a:rPr lang="ru-RU" sz="1400" i="1">
                             <a:latin typeface="Cambria Math" panose="02040503050406030204" pitchFamily="18" charset="0"/>
                             <a:ea typeface="Calibri" panose="020F0502020204030204" pitchFamily="34" charset="0"/>
                             <a:cs typeface="Times New Roman" panose="02020603050405020304" pitchFamily="18" charset="0"/>
@@ -10771,7 +10773,7 @@
                           <m:t>+</m:t>
                         </m:r>
                         <m:r>
-                          <a:rPr lang="en-US" sz="1200" i="1">
+                          <a:rPr lang="en-US" sz="1400" i="1">
                             <a:latin typeface="Cambria Math" panose="02040503050406030204" pitchFamily="18" charset="0"/>
                             <a:ea typeface="Calibri" panose="020F0502020204030204" pitchFamily="34" charset="0"/>
                             <a:cs typeface="Times New Roman" panose="02020603050405020304" pitchFamily="18" charset="0"/>
@@ -10783,14 +10785,14 @@
                   </m:oMath>
                 </a14:m>
                 <a:r>
-                  <a:rPr lang="ru-RU" sz="1200" dirty="0">
+                  <a:rPr lang="ru-RU" sz="1400" dirty="0">
                     <a:latin typeface="Times New Roman" panose="02020603050405020304" pitchFamily="18" charset="0"/>
                     <a:ea typeface="Times New Roman" panose="02020603050405020304" pitchFamily="18" charset="0"/>
                     <a:cs typeface="Times New Roman" panose="02020603050405020304" pitchFamily="18" charset="0"/>
                   </a:rPr>
                   <a:t>. </a:t>
                 </a:r>
-                <a:endParaRPr lang="ru-RU" sz="1200" dirty="0">
+                <a:endParaRPr lang="ru-RU" sz="1400" dirty="0">
                   <a:latin typeface="Times New Roman" panose="02020603050405020304" pitchFamily="18" charset="0"/>
                   <a:ea typeface="Calibri" panose="020F0502020204030204" pitchFamily="34" charset="0"/>
                   <a:cs typeface="Times New Roman" panose="02020603050405020304" pitchFamily="18" charset="0"/>
@@ -10798,13 +10800,13 @@
               </a:p>
               <a:p>
                 <a:r>
-                  <a:rPr lang="ru-RU" sz="1200" dirty="0">
+                  <a:rPr lang="ru-RU" sz="1400" dirty="0">
                     <a:latin typeface="Times New Roman" panose="02020603050405020304" pitchFamily="18" charset="0"/>
                     <a:ea typeface="Calibri" panose="020F0502020204030204" pitchFamily="34" charset="0"/>
                   </a:rPr>
                   <a:t>Чтобы агрегировать эту кривую в скаляр вычисляется площадь под этой кривой.</a:t>
                 </a:r>
-                <a:endParaRPr lang="ru-RU" sz="1200" dirty="0"/>
+                <a:endParaRPr lang="ru-RU" sz="1400" dirty="0"/>
               </a:p>
             </p:txBody>
           </p:sp>
@@ -10826,8 +10828,8 @@
             </p:nvSpPr>
             <p:spPr>
               <a:xfrm>
-                <a:off x="444679" y="3850721"/>
-                <a:ext cx="5183377" cy="2355869"/>
+                <a:off x="444678" y="3677154"/>
+                <a:ext cx="5183377" cy="3056606"/>
               </a:xfrm>
               <a:prstGeom prst="rect">
                 <a:avLst/>
@@ -10835,7 +10837,7 @@
               <a:blipFill>
                 <a:blip r:embed="rId5"/>
                 <a:stretch>
-                  <a:fillRect l="-118" b="-1036"/>
+                  <a:fillRect l="-353" r="-353" b="-996"/>
                 </a:stretch>
               </a:blipFill>
             </p:spPr>
@@ -10854,8 +10856,8 @@
           </p:sp>
         </mc:Fallback>
       </mc:AlternateContent>
-      <mc:AlternateContent xmlns:mc="http://schemas.openxmlformats.org/markup-compatibility/2006" xmlns:a14="http://schemas.microsoft.com/office/drawing/2010/main">
-        <mc:Choice Requires="a14">
+      <mc:AlternateContent xmlns:mc="http://schemas.openxmlformats.org/markup-compatibility/2006">
+        <mc:Choice xmlns:a14="http://schemas.microsoft.com/office/drawing/2010/main" Requires="a14">
           <p:sp>
             <p:nvSpPr>
               <p:cNvPr id="9" name="TextBox 8">
@@ -10870,8 +10872,8 @@
             </p:nvSpPr>
             <p:spPr>
               <a:xfrm>
-                <a:off x="6741910" y="4940819"/>
-                <a:ext cx="4751428" cy="1346019"/>
+                <a:off x="6563947" y="4330283"/>
+                <a:ext cx="4751428" cy="2264081"/>
               </a:xfrm>
               <a:prstGeom prst="rect">
                 <a:avLst/>
@@ -10884,7 +10886,7 @@
               </a:bodyPr>
               <a:lstStyle/>
               <a:p>
-                <a:pPr>
+                <a:pPr algn="just">
                   <a:lnSpc>
                     <a:spcPct val="150000"/>
                   </a:lnSpc>
@@ -10892,7 +10894,7 @@
                 <a14:m>
                   <m:oMath xmlns:m="http://schemas.openxmlformats.org/officeDocument/2006/math">
                     <m:r>
-                      <a:rPr lang="ru-RU" sz="1400" i="1">
+                      <a:rPr lang="ru-RU" sz="1600" i="1">
                         <a:latin typeface="Cambria Math" panose="02040503050406030204" pitchFamily="18" charset="0"/>
                         <a:ea typeface="Times New Roman" panose="02020603050405020304" pitchFamily="18" charset="0"/>
                         <a:cs typeface="Times New Roman" panose="02020603050405020304" pitchFamily="18" charset="0"/>
@@ -10902,21 +10904,21 @@
                   </m:oMath>
                 </a14:m>
                 <a:r>
-                  <a:rPr lang="ru-RU" sz="1400" dirty="0">
+                  <a:rPr lang="ru-RU" sz="1600" dirty="0">
                     <a:latin typeface="Times New Roman" panose="02020603050405020304" pitchFamily="18" charset="0"/>
                     <a:ea typeface="Times New Roman" panose="02020603050405020304" pitchFamily="18" charset="0"/>
                     <a:cs typeface="Times New Roman" panose="02020603050405020304" pitchFamily="18" charset="0"/>
                   </a:rPr>
                   <a:t> — количество действительно положительных объектов;</a:t>
                 </a:r>
-                <a:endParaRPr lang="ru-RU" sz="1400" dirty="0">
+                <a:endParaRPr lang="ru-RU" sz="1600" dirty="0">
                   <a:latin typeface="Times New Roman" panose="02020603050405020304" pitchFamily="18" charset="0"/>
                   <a:ea typeface="Calibri" panose="020F0502020204030204" pitchFamily="34" charset="0"/>
                   <a:cs typeface="Times New Roman" panose="02020603050405020304" pitchFamily="18" charset="0"/>
                 </a:endParaRPr>
               </a:p>
               <a:p>
-                <a:pPr>
+                <a:pPr algn="just">
                   <a:lnSpc>
                     <a:spcPct val="150000"/>
                   </a:lnSpc>
@@ -10924,7 +10926,7 @@
                 <a14:m>
                   <m:oMath xmlns:m="http://schemas.openxmlformats.org/officeDocument/2006/math">
                     <m:r>
-                      <a:rPr lang="ru-RU" sz="1400" i="1">
+                      <a:rPr lang="ru-RU" sz="1600" i="1">
                         <a:latin typeface="Cambria Math" panose="02040503050406030204" pitchFamily="18" charset="0"/>
                         <a:ea typeface="Times New Roman" panose="02020603050405020304" pitchFamily="18" charset="0"/>
                         <a:cs typeface="Times New Roman" panose="02020603050405020304" pitchFamily="18" charset="0"/>
@@ -10934,21 +10936,21 @@
                   </m:oMath>
                 </a14:m>
                 <a:r>
-                  <a:rPr lang="ru-RU" sz="1400" dirty="0">
+                  <a:rPr lang="ru-RU" sz="1600" dirty="0">
                     <a:latin typeface="Times New Roman" panose="02020603050405020304" pitchFamily="18" charset="0"/>
                     <a:ea typeface="Times New Roman" panose="02020603050405020304" pitchFamily="18" charset="0"/>
                     <a:cs typeface="Times New Roman" panose="02020603050405020304" pitchFamily="18" charset="0"/>
                   </a:rPr>
                   <a:t> — количество действительно отрицательных объектов;</a:t>
                 </a:r>
-                <a:endParaRPr lang="ru-RU" sz="1400" dirty="0">
+                <a:endParaRPr lang="ru-RU" sz="1600" dirty="0">
                   <a:latin typeface="Times New Roman" panose="02020603050405020304" pitchFamily="18" charset="0"/>
                   <a:ea typeface="Calibri" panose="020F0502020204030204" pitchFamily="34" charset="0"/>
                   <a:cs typeface="Times New Roman" panose="02020603050405020304" pitchFamily="18" charset="0"/>
                 </a:endParaRPr>
               </a:p>
               <a:p>
-                <a:pPr>
+                <a:pPr algn="just">
                   <a:lnSpc>
                     <a:spcPct val="150000"/>
                   </a:lnSpc>
@@ -10956,7 +10958,7 @@
                 <a14:m>
                   <m:oMath xmlns:m="http://schemas.openxmlformats.org/officeDocument/2006/math">
                     <m:r>
-                      <a:rPr lang="ru-RU" sz="1400" i="1">
+                      <a:rPr lang="ru-RU" sz="1600" i="1">
                         <a:latin typeface="Cambria Math" panose="02040503050406030204" pitchFamily="18" charset="0"/>
                         <a:ea typeface="Times New Roman" panose="02020603050405020304" pitchFamily="18" charset="0"/>
                         <a:cs typeface="Times New Roman" panose="02020603050405020304" pitchFamily="18" charset="0"/>
@@ -10966,21 +10968,21 @@
                   </m:oMath>
                 </a14:m>
                 <a:r>
-                  <a:rPr lang="ru-RU" sz="1400" dirty="0">
+                  <a:rPr lang="ru-RU" sz="1600" dirty="0">
                     <a:latin typeface="Times New Roman" panose="02020603050405020304" pitchFamily="18" charset="0"/>
                     <a:ea typeface="Times New Roman" panose="02020603050405020304" pitchFamily="18" charset="0"/>
                     <a:cs typeface="Times New Roman" panose="02020603050405020304" pitchFamily="18" charset="0"/>
                   </a:rPr>
                   <a:t> — количество ложноположительных объектов;</a:t>
                 </a:r>
-                <a:endParaRPr lang="ru-RU" sz="1400" dirty="0">
+                <a:endParaRPr lang="ru-RU" sz="1600" dirty="0">
                   <a:latin typeface="Times New Roman" panose="02020603050405020304" pitchFamily="18" charset="0"/>
                   <a:ea typeface="Calibri" panose="020F0502020204030204" pitchFamily="34" charset="0"/>
                   <a:cs typeface="Times New Roman" panose="02020603050405020304" pitchFamily="18" charset="0"/>
                 </a:endParaRPr>
               </a:p>
               <a:p>
-                <a:pPr>
+                <a:pPr algn="just">
                   <a:lnSpc>
                     <a:spcPct val="150000"/>
                   </a:lnSpc>
@@ -10988,7 +10990,7 @@
                 <a14:m>
                   <m:oMath xmlns:m="http://schemas.openxmlformats.org/officeDocument/2006/math">
                     <m:r>
-                      <a:rPr lang="ru-RU" sz="1400" i="1">
+                      <a:rPr lang="ru-RU" sz="1600" i="1">
                         <a:latin typeface="Cambria Math" panose="02040503050406030204" pitchFamily="18" charset="0"/>
                         <a:ea typeface="Calibri" panose="020F0502020204030204" pitchFamily="34" charset="0"/>
                         <a:cs typeface="Times New Roman" panose="02020603050405020304" pitchFamily="18" charset="0"/>
@@ -10998,14 +11000,14 @@
                   </m:oMath>
                 </a14:m>
                 <a:r>
-                  <a:rPr lang="ru-RU" sz="1400" dirty="0">
+                  <a:rPr lang="ru-RU" sz="1600" dirty="0">
                     <a:latin typeface="Times New Roman" panose="02020603050405020304" pitchFamily="18" charset="0"/>
                     <a:ea typeface="Times New Roman" panose="02020603050405020304" pitchFamily="18" charset="0"/>
                     <a:cs typeface="Times New Roman" panose="02020603050405020304" pitchFamily="18" charset="0"/>
                   </a:rPr>
                   <a:t> — количество ложноотрицательных объектов.</a:t>
                 </a:r>
-                <a:endParaRPr lang="ru-RU" sz="1400" dirty="0">
+                <a:endParaRPr lang="ru-RU" sz="1600" dirty="0">
                   <a:latin typeface="Times New Roman" panose="02020603050405020304" pitchFamily="18" charset="0"/>
                   <a:ea typeface="Calibri" panose="020F0502020204030204" pitchFamily="34" charset="0"/>
                   <a:cs typeface="Times New Roman" panose="02020603050405020304" pitchFamily="18" charset="0"/>
@@ -11014,7 +11016,7 @@
             </p:txBody>
           </p:sp>
         </mc:Choice>
-        <mc:Fallback xmlns="">
+        <mc:Fallback>
           <p:sp>
             <p:nvSpPr>
               <p:cNvPr id="9" name="TextBox 8">
@@ -11031,16 +11033,16 @@
             </p:nvSpPr>
             <p:spPr>
               <a:xfrm>
-                <a:off x="6741910" y="4940819"/>
-                <a:ext cx="4751428" cy="1346019"/>
+                <a:off x="6563947" y="4330283"/>
+                <a:ext cx="4751428" cy="2264081"/>
               </a:xfrm>
               <a:prstGeom prst="rect">
                 <a:avLst/>
               </a:prstGeom>
               <a:blipFill>
-                <a:blip r:embed="rId7"/>
+                <a:blip r:embed="rId6"/>
                 <a:stretch>
-                  <a:fillRect b="-4091"/>
+                  <a:fillRect l="-770" r="-642" b="-2419"/>
                 </a:stretch>
               </a:blipFill>
             </p:spPr>
@@ -11074,7 +11076,7 @@
           <p:nvPr/>
         </p:nvPicPr>
         <p:blipFill>
-          <a:blip r:embed="rId8">
+          <a:blip r:embed="rId7">
             <a:extLst>
               <a:ext uri="{28A0092B-C50C-407E-A947-70E740481C1C}">
                 <a14:useLocalDpi xmlns:a14="http://schemas.microsoft.com/office/drawing/2010/main" val="0"/>

</xml_diff>